<commit_message>
Add all required files for AWS deployment demo to week 5 day 1 folder
</commit_message>
<xml_diff>
--- a/week-5/day-1/aws-intro.pptx
+++ b/week-5/day-1/aws-intro.pptx
@@ -11,6 +11,9 @@
     <p:sldId id="259" r:id="rId5"/>
     <p:sldId id="261" r:id="rId6"/>
     <p:sldId id="263" r:id="rId7"/>
+    <p:sldId id="264" r:id="rId8"/>
+    <p:sldId id="265" r:id="rId9"/>
+    <p:sldId id="266" r:id="rId10"/>
   </p:sldIdLst>
   <p:sldSz cx="12192000" cy="6858000"/>
   <p:notesSz cx="6858000" cy="9144000"/>
@@ -109,6 +112,11 @@
       </a:defRPr>
     </a:lvl9pPr>
   </p:defaultTextStyle>
+  <p:extLst>
+    <p:ext uri="{EFAFB233-063F-42B5-8137-9DF3F51BA10A}">
+      <p15:sldGuideLst xmlns:p15="http://schemas.microsoft.com/office/powerpoint/2012/main"/>
+    </p:ext>
+  </p:extLst>
 </p:presentation>
 </file>
 
@@ -5378,6 +5386,1086 @@
 </p:sld>
 </file>
 
+<file path=ppt/slides/slide7.xml><?xml version="1.0" encoding="utf-8"?>
+<p:sld xmlns:a="http://schemas.openxmlformats.org/drawingml/2006/main" xmlns:r="http://schemas.openxmlformats.org/officeDocument/2006/relationships" xmlns:p="http://schemas.openxmlformats.org/presentationml/2006/main">
+  <p:cSld>
+    <p:spTree>
+      <p:nvGrpSpPr>
+        <p:cNvPr id="1" name=""/>
+        <p:cNvGrpSpPr/>
+        <p:nvPr/>
+      </p:nvGrpSpPr>
+      <p:grpSpPr>
+        <a:xfrm>
+          <a:off x="0" y="0"/>
+          <a:ext cx="0" cy="0"/>
+          <a:chOff x="0" y="0"/>
+          <a:chExt cx="0" cy="0"/>
+        </a:xfrm>
+      </p:grpSpPr>
+      <p:sp>
+        <p:nvSpPr>
+          <p:cNvPr id="4" name="Rectangle 3">
+            <a:extLst>
+              <a:ext uri="{FF2B5EF4-FFF2-40B4-BE49-F238E27FC236}">
+                <a16:creationId xmlns:a16="http://schemas.microsoft.com/office/drawing/2014/main" id="{27771797-AE84-45F8-B016-8A3D5AEF17CF}"/>
+              </a:ext>
+            </a:extLst>
+          </p:cNvPr>
+          <p:cNvSpPr/>
+          <p:nvPr/>
+        </p:nvSpPr>
+        <p:spPr>
+          <a:xfrm>
+            <a:off x="264170" y="325116"/>
+            <a:ext cx="7386590" cy="3680627"/>
+          </a:xfrm>
+          <a:prstGeom prst="rect">
+            <a:avLst/>
+          </a:prstGeom>
+          <a:solidFill>
+            <a:schemeClr val="bg1"/>
+          </a:solidFill>
+        </p:spPr>
+        <p:style>
+          <a:lnRef idx="2">
+            <a:schemeClr val="accent1">
+              <a:shade val="50000"/>
+            </a:schemeClr>
+          </a:lnRef>
+          <a:fillRef idx="1">
+            <a:schemeClr val="accent1"/>
+          </a:fillRef>
+          <a:effectRef idx="0">
+            <a:schemeClr val="accent1"/>
+          </a:effectRef>
+          <a:fontRef idx="minor">
+            <a:schemeClr val="lt1"/>
+          </a:fontRef>
+        </p:style>
+        <p:txBody>
+          <a:bodyPr rtlCol="0" anchor="ctr"/>
+          <a:lstStyle/>
+          <a:p>
+            <a:pPr algn="ctr"/>
+            <a:r>
+              <a:rPr lang="en-US" sz="2800" b="1" dirty="0">
+                <a:solidFill>
+                  <a:sysClr val="windowText" lastClr="000000"/>
+                </a:solidFill>
+              </a:rPr>
+              <a:t>My PC</a:t>
+            </a:r>
+          </a:p>
+        </p:txBody>
+      </p:sp>
+      <p:sp>
+        <p:nvSpPr>
+          <p:cNvPr id="5" name="Rectangle 4">
+            <a:extLst>
+              <a:ext uri="{FF2B5EF4-FFF2-40B4-BE49-F238E27FC236}">
+                <a16:creationId xmlns:a16="http://schemas.microsoft.com/office/drawing/2014/main" id="{C096B727-8D96-49C6-A585-FA20F9D2C798}"/>
+              </a:ext>
+            </a:extLst>
+          </p:cNvPr>
+          <p:cNvSpPr/>
+          <p:nvPr/>
+        </p:nvSpPr>
+        <p:spPr>
+          <a:xfrm>
+            <a:off x="8131675" y="2329237"/>
+            <a:ext cx="1755214" cy="1162130"/>
+          </a:xfrm>
+          <a:prstGeom prst="rect">
+            <a:avLst/>
+          </a:prstGeom>
+        </p:spPr>
+        <p:style>
+          <a:lnRef idx="2">
+            <a:schemeClr val="accent1">
+              <a:shade val="50000"/>
+            </a:schemeClr>
+          </a:lnRef>
+          <a:fillRef idx="1">
+            <a:schemeClr val="accent1"/>
+          </a:fillRef>
+          <a:effectRef idx="0">
+            <a:schemeClr val="accent1"/>
+          </a:effectRef>
+          <a:fontRef idx="minor">
+            <a:schemeClr val="lt1"/>
+          </a:fontRef>
+        </p:style>
+        <p:txBody>
+          <a:bodyPr rtlCol="0" anchor="ctr"/>
+          <a:lstStyle/>
+          <a:p>
+            <a:pPr algn="ctr"/>
+            <a:r>
+              <a:rPr lang="en-US" dirty="0"/>
+              <a:t>EC2 (running our application)</a:t>
+            </a:r>
+          </a:p>
+        </p:txBody>
+      </p:sp>
+      <p:sp>
+        <p:nvSpPr>
+          <p:cNvPr id="6" name="Rectangle 5">
+            <a:extLst>
+              <a:ext uri="{FF2B5EF4-FFF2-40B4-BE49-F238E27FC236}">
+                <a16:creationId xmlns:a16="http://schemas.microsoft.com/office/drawing/2014/main" id="{07D38883-EFDB-408E-897A-2AF592431128}"/>
+              </a:ext>
+            </a:extLst>
+          </p:cNvPr>
+          <p:cNvSpPr/>
+          <p:nvPr/>
+        </p:nvSpPr>
+        <p:spPr>
+          <a:xfrm>
+            <a:off x="4620652" y="484965"/>
+            <a:ext cx="2028671" cy="1162130"/>
+          </a:xfrm>
+          <a:prstGeom prst="rect">
+            <a:avLst/>
+          </a:prstGeom>
+        </p:spPr>
+        <p:style>
+          <a:lnRef idx="2">
+            <a:schemeClr val="accent1">
+              <a:shade val="50000"/>
+            </a:schemeClr>
+          </a:lnRef>
+          <a:fillRef idx="1">
+            <a:schemeClr val="accent1"/>
+          </a:fillRef>
+          <a:effectRef idx="0">
+            <a:schemeClr val="accent1"/>
+          </a:effectRef>
+          <a:fontRef idx="minor">
+            <a:schemeClr val="lt1"/>
+          </a:fontRef>
+        </p:style>
+        <p:txBody>
+          <a:bodyPr rtlCol="0" anchor="ctr"/>
+          <a:lstStyle/>
+          <a:p>
+            <a:pPr algn="ctr"/>
+            <a:r>
+              <a:rPr lang="en-US" dirty="0"/>
+              <a:t>Live Server</a:t>
+            </a:r>
+          </a:p>
+          <a:p>
+            <a:pPr algn="ctr"/>
+            <a:r>
+              <a:rPr lang="en-US" dirty="0"/>
+              <a:t>(hosts our HTML, JS, and CSS files)</a:t>
+            </a:r>
+          </a:p>
+        </p:txBody>
+      </p:sp>
+      <p:sp>
+        <p:nvSpPr>
+          <p:cNvPr id="7" name="Rectangle 6">
+            <a:extLst>
+              <a:ext uri="{FF2B5EF4-FFF2-40B4-BE49-F238E27FC236}">
+                <a16:creationId xmlns:a16="http://schemas.microsoft.com/office/drawing/2014/main" id="{DBEF989F-9D70-4876-B818-743AD83A9803}"/>
+              </a:ext>
+            </a:extLst>
+          </p:cNvPr>
+          <p:cNvSpPr/>
+          <p:nvPr/>
+        </p:nvSpPr>
+        <p:spPr>
+          <a:xfrm>
+            <a:off x="1298315" y="1748172"/>
+            <a:ext cx="1558071" cy="1162130"/>
+          </a:xfrm>
+          <a:prstGeom prst="rect">
+            <a:avLst/>
+          </a:prstGeom>
+        </p:spPr>
+        <p:style>
+          <a:lnRef idx="2">
+            <a:schemeClr val="accent1">
+              <a:shade val="50000"/>
+            </a:schemeClr>
+          </a:lnRef>
+          <a:fillRef idx="1">
+            <a:schemeClr val="accent1"/>
+          </a:fillRef>
+          <a:effectRef idx="0">
+            <a:schemeClr val="accent1"/>
+          </a:effectRef>
+          <a:fontRef idx="minor">
+            <a:schemeClr val="lt1"/>
+          </a:fontRef>
+        </p:style>
+        <p:txBody>
+          <a:bodyPr rtlCol="0" anchor="ctr"/>
+          <a:lstStyle/>
+          <a:p>
+            <a:pPr algn="ctr"/>
+            <a:r>
+              <a:rPr lang="en-US" dirty="0"/>
+              <a:t>Google Chrome Web Browser</a:t>
+            </a:r>
+          </a:p>
+        </p:txBody>
+      </p:sp>
+      <p:sp>
+        <p:nvSpPr>
+          <p:cNvPr id="21" name="Rectangle 20">
+            <a:extLst>
+              <a:ext uri="{FF2B5EF4-FFF2-40B4-BE49-F238E27FC236}">
+                <a16:creationId xmlns:a16="http://schemas.microsoft.com/office/drawing/2014/main" id="{5880EFF3-C087-4BE9-9257-05E69C300500}"/>
+              </a:ext>
+            </a:extLst>
+          </p:cNvPr>
+          <p:cNvSpPr/>
+          <p:nvPr/>
+        </p:nvSpPr>
+        <p:spPr>
+          <a:xfrm>
+            <a:off x="10044418" y="3808781"/>
+            <a:ext cx="2147582" cy="1862356"/>
+          </a:xfrm>
+          <a:prstGeom prst="rect">
+            <a:avLst/>
+          </a:prstGeom>
+        </p:spPr>
+        <p:style>
+          <a:lnRef idx="2">
+            <a:schemeClr val="accent1">
+              <a:shade val="50000"/>
+            </a:schemeClr>
+          </a:lnRef>
+          <a:fillRef idx="1">
+            <a:schemeClr val="accent1"/>
+          </a:fillRef>
+          <a:effectRef idx="0">
+            <a:schemeClr val="accent1"/>
+          </a:effectRef>
+          <a:fontRef idx="minor">
+            <a:schemeClr val="lt1"/>
+          </a:fontRef>
+        </p:style>
+        <p:txBody>
+          <a:bodyPr rtlCol="0" anchor="ctr"/>
+          <a:lstStyle/>
+          <a:p>
+            <a:pPr algn="ctr"/>
+            <a:r>
+              <a:rPr lang="en-US" dirty="0"/>
+              <a:t>AWS RDS (Postgres)</a:t>
+            </a:r>
+          </a:p>
+        </p:txBody>
+      </p:sp>
+      <p:sp>
+        <p:nvSpPr>
+          <p:cNvPr id="22" name="Arrow: Left-Right 21">
+            <a:extLst>
+              <a:ext uri="{FF2B5EF4-FFF2-40B4-BE49-F238E27FC236}">
+                <a16:creationId xmlns:a16="http://schemas.microsoft.com/office/drawing/2014/main" id="{6B6942E4-A4CA-440E-A17A-6C6C9606E973}"/>
+              </a:ext>
+            </a:extLst>
+          </p:cNvPr>
+          <p:cNvSpPr/>
+          <p:nvPr/>
+        </p:nvSpPr>
+        <p:spPr>
+          <a:xfrm rot="2672053">
+            <a:off x="9290691" y="3725744"/>
+            <a:ext cx="1644242" cy="317414"/>
+          </a:xfrm>
+          <a:prstGeom prst="leftRightArrow">
+            <a:avLst/>
+          </a:prstGeom>
+        </p:spPr>
+        <p:style>
+          <a:lnRef idx="2">
+            <a:schemeClr val="accent2">
+              <a:shade val="50000"/>
+            </a:schemeClr>
+          </a:lnRef>
+          <a:fillRef idx="1">
+            <a:schemeClr val="accent2"/>
+          </a:fillRef>
+          <a:effectRef idx="0">
+            <a:schemeClr val="accent2"/>
+          </a:effectRef>
+          <a:fontRef idx="minor">
+            <a:schemeClr val="lt1"/>
+          </a:fontRef>
+        </p:style>
+        <p:txBody>
+          <a:bodyPr rtlCol="0" anchor="ctr"/>
+          <a:lstStyle/>
+          <a:p>
+            <a:pPr algn="ctr"/>
+            <a:endParaRPr lang="en-US" dirty="0"/>
+          </a:p>
+        </p:txBody>
+      </p:sp>
+      <p:cxnSp>
+        <p:nvCxnSpPr>
+          <p:cNvPr id="3" name="Straight Arrow Connector 2">
+            <a:extLst>
+              <a:ext uri="{FF2B5EF4-FFF2-40B4-BE49-F238E27FC236}">
+                <a16:creationId xmlns:a16="http://schemas.microsoft.com/office/drawing/2014/main" id="{93EDBDB0-D684-4C59-AC8A-E4AE788AE01C}"/>
+              </a:ext>
+            </a:extLst>
+          </p:cNvPr>
+          <p:cNvCxnSpPr/>
+          <p:nvPr/>
+        </p:nvCxnSpPr>
+        <p:spPr>
+          <a:xfrm>
+            <a:off x="3078760" y="2785145"/>
+            <a:ext cx="4907559" cy="125157"/>
+          </a:xfrm>
+          <a:prstGeom prst="straightConnector1">
+            <a:avLst/>
+          </a:prstGeom>
+          <a:ln>
+            <a:tailEnd type="triangle"/>
+          </a:ln>
+        </p:spPr>
+        <p:style>
+          <a:lnRef idx="1">
+            <a:schemeClr val="accent1"/>
+          </a:lnRef>
+          <a:fillRef idx="0">
+            <a:schemeClr val="accent1"/>
+          </a:fillRef>
+          <a:effectRef idx="0">
+            <a:schemeClr val="accent1"/>
+          </a:effectRef>
+          <a:fontRef idx="minor">
+            <a:schemeClr val="tx1"/>
+          </a:fontRef>
+        </p:style>
+      </p:cxnSp>
+      <p:cxnSp>
+        <p:nvCxnSpPr>
+          <p:cNvPr id="9" name="Straight Arrow Connector 8">
+            <a:extLst>
+              <a:ext uri="{FF2B5EF4-FFF2-40B4-BE49-F238E27FC236}">
+                <a16:creationId xmlns:a16="http://schemas.microsoft.com/office/drawing/2014/main" id="{03B69EF9-D63D-4155-82ED-DC1EDF1B772E}"/>
+              </a:ext>
+            </a:extLst>
+          </p:cNvPr>
+          <p:cNvCxnSpPr/>
+          <p:nvPr/>
+        </p:nvCxnSpPr>
+        <p:spPr>
+          <a:xfrm flipH="1" flipV="1">
+            <a:off x="3053593" y="2583809"/>
+            <a:ext cx="4932726" cy="75501"/>
+          </a:xfrm>
+          <a:prstGeom prst="straightConnector1">
+            <a:avLst/>
+          </a:prstGeom>
+          <a:ln>
+            <a:tailEnd type="triangle"/>
+          </a:ln>
+        </p:spPr>
+        <p:style>
+          <a:lnRef idx="1">
+            <a:schemeClr val="accent1"/>
+          </a:lnRef>
+          <a:fillRef idx="0">
+            <a:schemeClr val="accent1"/>
+          </a:fillRef>
+          <a:effectRef idx="0">
+            <a:schemeClr val="accent1"/>
+          </a:effectRef>
+          <a:fontRef idx="minor">
+            <a:schemeClr val="tx1"/>
+          </a:fontRef>
+        </p:style>
+      </p:cxnSp>
+    </p:spTree>
+    <p:extLst>
+      <p:ext uri="{BB962C8B-B14F-4D97-AF65-F5344CB8AC3E}">
+        <p14:creationId xmlns:p14="http://schemas.microsoft.com/office/powerpoint/2010/main" val="3443092444"/>
+      </p:ext>
+    </p:extLst>
+  </p:cSld>
+  <p:clrMapOvr>
+    <a:masterClrMapping/>
+  </p:clrMapOvr>
+</p:sld>
+</file>
+
+<file path=ppt/slides/slide8.xml><?xml version="1.0" encoding="utf-8"?>
+<p:sld xmlns:a="http://schemas.openxmlformats.org/drawingml/2006/main" xmlns:r="http://schemas.openxmlformats.org/officeDocument/2006/relationships" xmlns:p="http://schemas.openxmlformats.org/presentationml/2006/main">
+  <p:cSld>
+    <p:spTree>
+      <p:nvGrpSpPr>
+        <p:cNvPr id="1" name=""/>
+        <p:cNvGrpSpPr/>
+        <p:nvPr/>
+      </p:nvGrpSpPr>
+      <p:grpSpPr>
+        <a:xfrm>
+          <a:off x="0" y="0"/>
+          <a:ext cx="0" cy="0"/>
+          <a:chOff x="0" y="0"/>
+          <a:chExt cx="0" cy="0"/>
+        </a:xfrm>
+      </p:grpSpPr>
+      <p:sp>
+        <p:nvSpPr>
+          <p:cNvPr id="2" name="Title 1">
+            <a:extLst>
+              <a:ext uri="{FF2B5EF4-FFF2-40B4-BE49-F238E27FC236}">
+                <a16:creationId xmlns:a16="http://schemas.microsoft.com/office/drawing/2014/main" id="{1F7FDD7B-8AB9-4E72-BFC4-A1066B03FF21}"/>
+              </a:ext>
+            </a:extLst>
+          </p:cNvPr>
+          <p:cNvSpPr>
+            <a:spLocks noGrp="1"/>
+          </p:cNvSpPr>
+          <p:nvPr>
+            <p:ph type="title"/>
+          </p:nvPr>
+        </p:nvSpPr>
+        <p:spPr/>
+        <p:txBody>
+          <a:bodyPr/>
+          <a:lstStyle/>
+          <a:p>
+            <a:r>
+              <a:rPr lang="en-US" dirty="0"/>
+              <a:t>AWS S3</a:t>
+            </a:r>
+          </a:p>
+        </p:txBody>
+      </p:sp>
+      <p:sp>
+        <p:nvSpPr>
+          <p:cNvPr id="3" name="Content Placeholder 2">
+            <a:extLst>
+              <a:ext uri="{FF2B5EF4-FFF2-40B4-BE49-F238E27FC236}">
+                <a16:creationId xmlns:a16="http://schemas.microsoft.com/office/drawing/2014/main" id="{EC31F2C5-1A0F-4FCA-BB87-C6BFE41531EF}"/>
+              </a:ext>
+            </a:extLst>
+          </p:cNvPr>
+          <p:cNvSpPr>
+            <a:spLocks noGrp="1"/>
+          </p:cNvSpPr>
+          <p:nvPr>
+            <p:ph idx="1"/>
+          </p:nvPr>
+        </p:nvSpPr>
+        <p:spPr/>
+        <p:txBody>
+          <a:bodyPr/>
+          <a:lstStyle/>
+          <a:p>
+            <a:r>
+              <a:rPr lang="en-US" dirty="0"/>
+              <a:t>Object storage for any types of data</a:t>
+            </a:r>
+          </a:p>
+          <a:p>
+            <a:r>
+              <a:rPr lang="en-US" dirty="0"/>
+              <a:t>Each “object” can have a maximum size of 5TB</a:t>
+            </a:r>
+          </a:p>
+          <a:p>
+            <a:r>
+              <a:rPr lang="en-US" dirty="0"/>
+              <a:t>S3 is an AWS service for storing large amounts of data very cheaply</a:t>
+            </a:r>
+          </a:p>
+          <a:p>
+            <a:r>
+              <a:rPr lang="en-US" dirty="0"/>
+              <a:t>A lot of the times is used to host HTML, JS, CSS files (frontend)</a:t>
+            </a:r>
+          </a:p>
+          <a:p>
+            <a:pPr lvl="1"/>
+            <a:r>
+              <a:rPr lang="en-US" dirty="0"/>
+              <a:t>This is what we are using S3 for</a:t>
+            </a:r>
+          </a:p>
+        </p:txBody>
+      </p:sp>
+    </p:spTree>
+    <p:extLst>
+      <p:ext uri="{BB962C8B-B14F-4D97-AF65-F5344CB8AC3E}">
+        <p14:creationId xmlns:p14="http://schemas.microsoft.com/office/powerpoint/2010/main" val="500337618"/>
+      </p:ext>
+    </p:extLst>
+  </p:cSld>
+  <p:clrMapOvr>
+    <a:masterClrMapping/>
+  </p:clrMapOvr>
+</p:sld>
+</file>
+
+<file path=ppt/slides/slide9.xml><?xml version="1.0" encoding="utf-8"?>
+<p:sld xmlns:a="http://schemas.openxmlformats.org/drawingml/2006/main" xmlns:r="http://schemas.openxmlformats.org/officeDocument/2006/relationships" xmlns:p="http://schemas.openxmlformats.org/presentationml/2006/main">
+  <p:cSld>
+    <p:spTree>
+      <p:nvGrpSpPr>
+        <p:cNvPr id="1" name=""/>
+        <p:cNvGrpSpPr/>
+        <p:nvPr/>
+      </p:nvGrpSpPr>
+      <p:grpSpPr>
+        <a:xfrm>
+          <a:off x="0" y="0"/>
+          <a:ext cx="0" cy="0"/>
+          <a:chOff x="0" y="0"/>
+          <a:chExt cx="0" cy="0"/>
+        </a:xfrm>
+      </p:grpSpPr>
+      <p:sp>
+        <p:nvSpPr>
+          <p:cNvPr id="4" name="Rectangle 3">
+            <a:extLst>
+              <a:ext uri="{FF2B5EF4-FFF2-40B4-BE49-F238E27FC236}">
+                <a16:creationId xmlns:a16="http://schemas.microsoft.com/office/drawing/2014/main" id="{27771797-AE84-45F8-B016-8A3D5AEF17CF}"/>
+              </a:ext>
+            </a:extLst>
+          </p:cNvPr>
+          <p:cNvSpPr/>
+          <p:nvPr/>
+        </p:nvSpPr>
+        <p:spPr>
+          <a:xfrm>
+            <a:off x="264170" y="325116"/>
+            <a:ext cx="3603155" cy="3680627"/>
+          </a:xfrm>
+          <a:prstGeom prst="rect">
+            <a:avLst/>
+          </a:prstGeom>
+          <a:solidFill>
+            <a:schemeClr val="bg1"/>
+          </a:solidFill>
+        </p:spPr>
+        <p:style>
+          <a:lnRef idx="2">
+            <a:schemeClr val="accent1">
+              <a:shade val="50000"/>
+            </a:schemeClr>
+          </a:lnRef>
+          <a:fillRef idx="1">
+            <a:schemeClr val="accent1"/>
+          </a:fillRef>
+          <a:effectRef idx="0">
+            <a:schemeClr val="accent1"/>
+          </a:effectRef>
+          <a:fontRef idx="minor">
+            <a:schemeClr val="lt1"/>
+          </a:fontRef>
+        </p:style>
+        <p:txBody>
+          <a:bodyPr rtlCol="0" anchor="ctr"/>
+          <a:lstStyle/>
+          <a:p>
+            <a:pPr algn="ctr"/>
+            <a:r>
+              <a:rPr lang="en-US" sz="2800" b="1" dirty="0">
+                <a:solidFill>
+                  <a:sysClr val="windowText" lastClr="000000"/>
+                </a:solidFill>
+              </a:rPr>
+              <a:t>My PC</a:t>
+            </a:r>
+          </a:p>
+        </p:txBody>
+      </p:sp>
+      <p:sp>
+        <p:nvSpPr>
+          <p:cNvPr id="5" name="Rectangle 4">
+            <a:extLst>
+              <a:ext uri="{FF2B5EF4-FFF2-40B4-BE49-F238E27FC236}">
+                <a16:creationId xmlns:a16="http://schemas.microsoft.com/office/drawing/2014/main" id="{C096B727-8D96-49C6-A585-FA20F9D2C798}"/>
+              </a:ext>
+            </a:extLst>
+          </p:cNvPr>
+          <p:cNvSpPr/>
+          <p:nvPr/>
+        </p:nvSpPr>
+        <p:spPr>
+          <a:xfrm>
+            <a:off x="8131675" y="2329237"/>
+            <a:ext cx="1755214" cy="1162130"/>
+          </a:xfrm>
+          <a:prstGeom prst="rect">
+            <a:avLst/>
+          </a:prstGeom>
+        </p:spPr>
+        <p:style>
+          <a:lnRef idx="2">
+            <a:schemeClr val="accent1">
+              <a:shade val="50000"/>
+            </a:schemeClr>
+          </a:lnRef>
+          <a:fillRef idx="1">
+            <a:schemeClr val="accent1"/>
+          </a:fillRef>
+          <a:effectRef idx="0">
+            <a:schemeClr val="accent1"/>
+          </a:effectRef>
+          <a:fontRef idx="minor">
+            <a:schemeClr val="lt1"/>
+          </a:fontRef>
+        </p:style>
+        <p:txBody>
+          <a:bodyPr rtlCol="0" anchor="ctr"/>
+          <a:lstStyle/>
+          <a:p>
+            <a:pPr algn="ctr"/>
+            <a:r>
+              <a:rPr lang="en-US" dirty="0"/>
+              <a:t>EC2 (running our application)</a:t>
+            </a:r>
+          </a:p>
+        </p:txBody>
+      </p:sp>
+      <p:sp>
+        <p:nvSpPr>
+          <p:cNvPr id="7" name="Rectangle 6">
+            <a:extLst>
+              <a:ext uri="{FF2B5EF4-FFF2-40B4-BE49-F238E27FC236}">
+                <a16:creationId xmlns:a16="http://schemas.microsoft.com/office/drawing/2014/main" id="{DBEF989F-9D70-4876-B818-743AD83A9803}"/>
+              </a:ext>
+            </a:extLst>
+          </p:cNvPr>
+          <p:cNvSpPr/>
+          <p:nvPr/>
+        </p:nvSpPr>
+        <p:spPr>
+          <a:xfrm>
+            <a:off x="1252241" y="698383"/>
+            <a:ext cx="1558071" cy="1162130"/>
+          </a:xfrm>
+          <a:prstGeom prst="rect">
+            <a:avLst/>
+          </a:prstGeom>
+        </p:spPr>
+        <p:style>
+          <a:lnRef idx="2">
+            <a:schemeClr val="accent1">
+              <a:shade val="50000"/>
+            </a:schemeClr>
+          </a:lnRef>
+          <a:fillRef idx="1">
+            <a:schemeClr val="accent1"/>
+          </a:fillRef>
+          <a:effectRef idx="0">
+            <a:schemeClr val="accent1"/>
+          </a:effectRef>
+          <a:fontRef idx="minor">
+            <a:schemeClr val="lt1"/>
+          </a:fontRef>
+        </p:style>
+        <p:txBody>
+          <a:bodyPr rtlCol="0" anchor="ctr"/>
+          <a:lstStyle/>
+          <a:p>
+            <a:pPr algn="ctr"/>
+            <a:r>
+              <a:rPr lang="en-US" dirty="0"/>
+              <a:t>Google Chrome Web Browser</a:t>
+            </a:r>
+          </a:p>
+        </p:txBody>
+      </p:sp>
+      <p:sp>
+        <p:nvSpPr>
+          <p:cNvPr id="21" name="Rectangle 20">
+            <a:extLst>
+              <a:ext uri="{FF2B5EF4-FFF2-40B4-BE49-F238E27FC236}">
+                <a16:creationId xmlns:a16="http://schemas.microsoft.com/office/drawing/2014/main" id="{5880EFF3-C087-4BE9-9257-05E69C300500}"/>
+              </a:ext>
+            </a:extLst>
+          </p:cNvPr>
+          <p:cNvSpPr/>
+          <p:nvPr/>
+        </p:nvSpPr>
+        <p:spPr>
+          <a:xfrm>
+            <a:off x="10044418" y="3808781"/>
+            <a:ext cx="2147582" cy="1862356"/>
+          </a:xfrm>
+          <a:prstGeom prst="rect">
+            <a:avLst/>
+          </a:prstGeom>
+        </p:spPr>
+        <p:style>
+          <a:lnRef idx="2">
+            <a:schemeClr val="accent1">
+              <a:shade val="50000"/>
+            </a:schemeClr>
+          </a:lnRef>
+          <a:fillRef idx="1">
+            <a:schemeClr val="accent1"/>
+          </a:fillRef>
+          <a:effectRef idx="0">
+            <a:schemeClr val="accent1"/>
+          </a:effectRef>
+          <a:fontRef idx="minor">
+            <a:schemeClr val="lt1"/>
+          </a:fontRef>
+        </p:style>
+        <p:txBody>
+          <a:bodyPr rtlCol="0" anchor="ctr"/>
+          <a:lstStyle/>
+          <a:p>
+            <a:pPr algn="ctr"/>
+            <a:r>
+              <a:rPr lang="en-US" dirty="0"/>
+              <a:t>AWS RDS (Postgres)</a:t>
+            </a:r>
+          </a:p>
+        </p:txBody>
+      </p:sp>
+      <p:sp>
+        <p:nvSpPr>
+          <p:cNvPr id="22" name="Arrow: Left-Right 21">
+            <a:extLst>
+              <a:ext uri="{FF2B5EF4-FFF2-40B4-BE49-F238E27FC236}">
+                <a16:creationId xmlns:a16="http://schemas.microsoft.com/office/drawing/2014/main" id="{6B6942E4-A4CA-440E-A17A-6C6C9606E973}"/>
+              </a:ext>
+            </a:extLst>
+          </p:cNvPr>
+          <p:cNvSpPr/>
+          <p:nvPr/>
+        </p:nvSpPr>
+        <p:spPr>
+          <a:xfrm rot="2672053">
+            <a:off x="9290691" y="3725744"/>
+            <a:ext cx="1644242" cy="317414"/>
+          </a:xfrm>
+          <a:prstGeom prst="leftRightArrow">
+            <a:avLst/>
+          </a:prstGeom>
+        </p:spPr>
+        <p:style>
+          <a:lnRef idx="2">
+            <a:schemeClr val="accent2">
+              <a:shade val="50000"/>
+            </a:schemeClr>
+          </a:lnRef>
+          <a:fillRef idx="1">
+            <a:schemeClr val="accent2"/>
+          </a:fillRef>
+          <a:effectRef idx="0">
+            <a:schemeClr val="accent2"/>
+          </a:effectRef>
+          <a:fontRef idx="minor">
+            <a:schemeClr val="lt1"/>
+          </a:fontRef>
+        </p:style>
+        <p:txBody>
+          <a:bodyPr rtlCol="0" anchor="ctr"/>
+          <a:lstStyle/>
+          <a:p>
+            <a:pPr algn="ctr"/>
+            <a:endParaRPr lang="en-US" dirty="0"/>
+          </a:p>
+        </p:txBody>
+      </p:sp>
+      <p:cxnSp>
+        <p:nvCxnSpPr>
+          <p:cNvPr id="3" name="Straight Arrow Connector 2">
+            <a:extLst>
+              <a:ext uri="{FF2B5EF4-FFF2-40B4-BE49-F238E27FC236}">
+                <a16:creationId xmlns:a16="http://schemas.microsoft.com/office/drawing/2014/main" id="{93EDBDB0-D684-4C59-AC8A-E4AE788AE01C}"/>
+              </a:ext>
+            </a:extLst>
+          </p:cNvPr>
+          <p:cNvCxnSpPr>
+            <a:cxnSpLocks/>
+          </p:cNvCxnSpPr>
+          <p:nvPr/>
+        </p:nvCxnSpPr>
+        <p:spPr>
+          <a:xfrm>
+            <a:off x="2919369" y="1932769"/>
+            <a:ext cx="5066950" cy="977533"/>
+          </a:xfrm>
+          <a:prstGeom prst="straightConnector1">
+            <a:avLst/>
+          </a:prstGeom>
+          <a:ln>
+            <a:tailEnd type="triangle"/>
+          </a:ln>
+        </p:spPr>
+        <p:style>
+          <a:lnRef idx="1">
+            <a:schemeClr val="accent1"/>
+          </a:lnRef>
+          <a:fillRef idx="0">
+            <a:schemeClr val="accent1"/>
+          </a:fillRef>
+          <a:effectRef idx="0">
+            <a:schemeClr val="accent1"/>
+          </a:effectRef>
+          <a:fontRef idx="minor">
+            <a:schemeClr val="tx1"/>
+          </a:fontRef>
+        </p:style>
+      </p:cxnSp>
+      <p:cxnSp>
+        <p:nvCxnSpPr>
+          <p:cNvPr id="9" name="Straight Arrow Connector 8">
+            <a:extLst>
+              <a:ext uri="{FF2B5EF4-FFF2-40B4-BE49-F238E27FC236}">
+                <a16:creationId xmlns:a16="http://schemas.microsoft.com/office/drawing/2014/main" id="{03B69EF9-D63D-4155-82ED-DC1EDF1B772E}"/>
+              </a:ext>
+            </a:extLst>
+          </p:cNvPr>
+          <p:cNvCxnSpPr>
+            <a:cxnSpLocks/>
+          </p:cNvCxnSpPr>
+          <p:nvPr/>
+        </p:nvCxnSpPr>
+        <p:spPr>
+          <a:xfrm flipH="1" flipV="1">
+            <a:off x="2919369" y="1598712"/>
+            <a:ext cx="5066950" cy="1060599"/>
+          </a:xfrm>
+          <a:prstGeom prst="straightConnector1">
+            <a:avLst/>
+          </a:prstGeom>
+          <a:ln>
+            <a:tailEnd type="triangle"/>
+          </a:ln>
+        </p:spPr>
+        <p:style>
+          <a:lnRef idx="1">
+            <a:schemeClr val="accent1"/>
+          </a:lnRef>
+          <a:fillRef idx="0">
+            <a:schemeClr val="accent1"/>
+          </a:fillRef>
+          <a:effectRef idx="0">
+            <a:schemeClr val="accent1"/>
+          </a:effectRef>
+          <a:fontRef idx="minor">
+            <a:schemeClr val="tx1"/>
+          </a:fontRef>
+        </p:style>
+      </p:cxnSp>
+      <p:sp>
+        <p:nvSpPr>
+          <p:cNvPr id="2" name="Rectangle 1">
+            <a:extLst>
+              <a:ext uri="{FF2B5EF4-FFF2-40B4-BE49-F238E27FC236}">
+                <a16:creationId xmlns:a16="http://schemas.microsoft.com/office/drawing/2014/main" id="{3FCAA0C4-359D-47ED-905D-3432DF2A4527}"/>
+              </a:ext>
+            </a:extLst>
+          </p:cNvPr>
+          <p:cNvSpPr/>
+          <p:nvPr/>
+        </p:nvSpPr>
+        <p:spPr>
+          <a:xfrm>
+            <a:off x="7986319" y="159391"/>
+            <a:ext cx="2058099" cy="1077985"/>
+          </a:xfrm>
+          <a:prstGeom prst="rect">
+            <a:avLst/>
+          </a:prstGeom>
+        </p:spPr>
+        <p:style>
+          <a:lnRef idx="2">
+            <a:schemeClr val="accent6">
+              <a:shade val="50000"/>
+            </a:schemeClr>
+          </a:lnRef>
+          <a:fillRef idx="1">
+            <a:schemeClr val="accent6"/>
+          </a:fillRef>
+          <a:effectRef idx="0">
+            <a:schemeClr val="accent6"/>
+          </a:effectRef>
+          <a:fontRef idx="minor">
+            <a:schemeClr val="lt1"/>
+          </a:fontRef>
+        </p:style>
+        <p:txBody>
+          <a:bodyPr rtlCol="0" anchor="ctr"/>
+          <a:lstStyle/>
+          <a:p>
+            <a:pPr algn="ctr"/>
+            <a:r>
+              <a:rPr lang="en-US" dirty="0"/>
+              <a:t>S3 (with frontend files)</a:t>
+            </a:r>
+          </a:p>
+        </p:txBody>
+      </p:sp>
+      <p:cxnSp>
+        <p:nvCxnSpPr>
+          <p:cNvPr id="10" name="Straight Arrow Connector 9">
+            <a:extLst>
+              <a:ext uri="{FF2B5EF4-FFF2-40B4-BE49-F238E27FC236}">
+                <a16:creationId xmlns:a16="http://schemas.microsoft.com/office/drawing/2014/main" id="{9321DBD2-D483-471F-9A01-415ACC767369}"/>
+              </a:ext>
+            </a:extLst>
+          </p:cNvPr>
+          <p:cNvCxnSpPr>
+            <a:cxnSpLocks/>
+          </p:cNvCxnSpPr>
+          <p:nvPr/>
+        </p:nvCxnSpPr>
+        <p:spPr>
+          <a:xfrm flipH="1">
+            <a:off x="2919369" y="612396"/>
+            <a:ext cx="4798503" cy="368059"/>
+          </a:xfrm>
+          <a:prstGeom prst="straightConnector1">
+            <a:avLst/>
+          </a:prstGeom>
+          <a:ln>
+            <a:tailEnd type="triangle"/>
+          </a:ln>
+        </p:spPr>
+        <p:style>
+          <a:lnRef idx="1">
+            <a:schemeClr val="accent1"/>
+          </a:lnRef>
+          <a:fillRef idx="0">
+            <a:schemeClr val="accent1"/>
+          </a:fillRef>
+          <a:effectRef idx="0">
+            <a:schemeClr val="accent1"/>
+          </a:effectRef>
+          <a:fontRef idx="minor">
+            <a:schemeClr val="tx1"/>
+          </a:fontRef>
+        </p:style>
+      </p:cxnSp>
+      <p:sp>
+        <p:nvSpPr>
+          <p:cNvPr id="11" name="TextBox 10">
+            <a:extLst>
+              <a:ext uri="{FF2B5EF4-FFF2-40B4-BE49-F238E27FC236}">
+                <a16:creationId xmlns:a16="http://schemas.microsoft.com/office/drawing/2014/main" id="{0F2C37A6-15B0-41B6-B660-E8C1203F564A}"/>
+              </a:ext>
+            </a:extLst>
+          </p:cNvPr>
+          <p:cNvSpPr txBox="1"/>
+          <p:nvPr/>
+        </p:nvSpPr>
+        <p:spPr>
+          <a:xfrm>
+            <a:off x="4644704" y="146313"/>
+            <a:ext cx="1347831" cy="1477328"/>
+          </a:xfrm>
+          <a:prstGeom prst="rect">
+            <a:avLst/>
+          </a:prstGeom>
+          <a:noFill/>
+        </p:spPr>
+        <p:txBody>
+          <a:bodyPr wrap="square" rtlCol="0">
+            <a:spAutoFit/>
+          </a:bodyPr>
+          <a:lstStyle/>
+          <a:p>
+            <a:r>
+              <a:rPr lang="en-US" dirty="0"/>
+              <a:t>Serves HTML, JS, and CSS files to the browser</a:t>
+            </a:r>
+          </a:p>
+        </p:txBody>
+      </p:sp>
+      <p:sp>
+        <p:nvSpPr>
+          <p:cNvPr id="12" name="TextBox 11">
+            <a:extLst>
+              <a:ext uri="{FF2B5EF4-FFF2-40B4-BE49-F238E27FC236}">
+                <a16:creationId xmlns:a16="http://schemas.microsoft.com/office/drawing/2014/main" id="{520F393F-90AE-4166-8E75-EE9C7E5ADD7F}"/>
+              </a:ext>
+            </a:extLst>
+          </p:cNvPr>
+          <p:cNvSpPr txBox="1"/>
+          <p:nvPr/>
+        </p:nvSpPr>
+        <p:spPr>
+          <a:xfrm>
+            <a:off x="3028425" y="2271497"/>
+            <a:ext cx="2614056" cy="923330"/>
+          </a:xfrm>
+          <a:prstGeom prst="rect">
+            <a:avLst/>
+          </a:prstGeom>
+          <a:noFill/>
+        </p:spPr>
+        <p:txBody>
+          <a:bodyPr wrap="square" rtlCol="0">
+            <a:spAutoFit/>
+          </a:bodyPr>
+          <a:lstStyle/>
+          <a:p>
+            <a:r>
+              <a:rPr lang="en-US" dirty="0"/>
+              <a:t>Sends HTTP requests via fetch API to add students or to retrieve students</a:t>
+            </a:r>
+          </a:p>
+        </p:txBody>
+      </p:sp>
+      <p:sp>
+        <p:nvSpPr>
+          <p:cNvPr id="13" name="TextBox 12">
+            <a:extLst>
+              <a:ext uri="{FF2B5EF4-FFF2-40B4-BE49-F238E27FC236}">
+                <a16:creationId xmlns:a16="http://schemas.microsoft.com/office/drawing/2014/main" id="{43BE00A2-4489-4E7E-9241-7FEFD3591783}"/>
+              </a:ext>
+            </a:extLst>
+          </p:cNvPr>
+          <p:cNvSpPr txBox="1"/>
+          <p:nvPr/>
+        </p:nvSpPr>
+        <p:spPr>
+          <a:xfrm>
+            <a:off x="5642481" y="1865278"/>
+            <a:ext cx="2214693" cy="646331"/>
+          </a:xfrm>
+          <a:prstGeom prst="rect">
+            <a:avLst/>
+          </a:prstGeom>
+          <a:noFill/>
+        </p:spPr>
+        <p:txBody>
+          <a:bodyPr wrap="square" rtlCol="0">
+            <a:spAutoFit/>
+          </a:bodyPr>
+          <a:lstStyle/>
+          <a:p>
+            <a:r>
+              <a:rPr lang="en-US" dirty="0"/>
+              <a:t>HTTP Response w/ data is sent back</a:t>
+            </a:r>
+          </a:p>
+        </p:txBody>
+      </p:sp>
+    </p:spTree>
+    <p:extLst>
+      <p:ext uri="{BB962C8B-B14F-4D97-AF65-F5344CB8AC3E}">
+        <p14:creationId xmlns:p14="http://schemas.microsoft.com/office/powerpoint/2010/main" val="3057194160"/>
+      </p:ext>
+    </p:extLst>
+  </p:cSld>
+  <p:clrMapOvr>
+    <a:masterClrMapping/>
+  </p:clrMapOvr>
+</p:sld>
+</file>
+
 <file path=ppt/theme/theme1.xml><?xml version="1.0" encoding="utf-8"?>
 <a:theme xmlns:a="http://schemas.openxmlformats.org/drawingml/2006/main" name="Office Theme">
   <a:themeElements>

</xml_diff>